<commit_message>
update our story slide
</commit_message>
<xml_diff>
--- a/presentation.pptx
+++ b/presentation.pptx
@@ -5956,6 +5956,96 @@
           </a:p>
         </p:txBody>
       </p:sp>
+      <p:pic>
+        <p:nvPicPr>
+          <p:cNvPr id="4" name="Picture 3"/>
+          <p:cNvPicPr>
+            <a:picLocks noChangeAspect="1"/>
+          </p:cNvPicPr>
+          <p:nvPr/>
+        </p:nvPicPr>
+        <p:blipFill>
+          <a:blip r:embed="rId2">
+            <a:extLst>
+              <a:ext uri="{28A0092B-C50C-407E-A947-70E740481C1C}">
+                <a14:useLocalDpi xmlns:a14="http://schemas.microsoft.com/office/drawing/2010/main" val="0"/>
+              </a:ext>
+            </a:extLst>
+          </a:blip>
+          <a:stretch>
+            <a:fillRect/>
+          </a:stretch>
+        </p:blipFill>
+        <p:spPr>
+          <a:xfrm>
+            <a:off x="685800" y="4206622"/>
+            <a:ext cx="3568700" cy="2273300"/>
+          </a:xfrm>
+          <a:prstGeom prst="rect">
+            <a:avLst/>
+          </a:prstGeom>
+        </p:spPr>
+      </p:pic>
+      <p:pic>
+        <p:nvPicPr>
+          <p:cNvPr id="5" name="Picture 4"/>
+          <p:cNvPicPr>
+            <a:picLocks noChangeAspect="1"/>
+          </p:cNvPicPr>
+          <p:nvPr/>
+        </p:nvPicPr>
+        <p:blipFill>
+          <a:blip r:embed="rId3">
+            <a:extLst>
+              <a:ext uri="{28A0092B-C50C-407E-A947-70E740481C1C}">
+                <a14:useLocalDpi xmlns:a14="http://schemas.microsoft.com/office/drawing/2010/main" val="0"/>
+              </a:ext>
+            </a:extLst>
+          </a:blip>
+          <a:stretch>
+            <a:fillRect/>
+          </a:stretch>
+        </p:blipFill>
+        <p:spPr>
+          <a:xfrm>
+            <a:off x="4254500" y="4206622"/>
+            <a:ext cx="3958216" cy="2273300"/>
+          </a:xfrm>
+          <a:prstGeom prst="rect">
+            <a:avLst/>
+          </a:prstGeom>
+        </p:spPr>
+      </p:pic>
+      <p:pic>
+        <p:nvPicPr>
+          <p:cNvPr id="6" name="Picture 5"/>
+          <p:cNvPicPr>
+            <a:picLocks noChangeAspect="1"/>
+          </p:cNvPicPr>
+          <p:nvPr/>
+        </p:nvPicPr>
+        <p:blipFill>
+          <a:blip r:embed="rId4">
+            <a:extLst>
+              <a:ext uri="{28A0092B-C50C-407E-A947-70E740481C1C}">
+                <a14:useLocalDpi xmlns:a14="http://schemas.microsoft.com/office/drawing/2010/main" val="0"/>
+              </a:ext>
+            </a:extLst>
+          </a:blip>
+          <a:stretch>
+            <a:fillRect/>
+          </a:stretch>
+        </p:blipFill>
+        <p:spPr>
+          <a:xfrm>
+            <a:off x="8212716" y="4206622"/>
+            <a:ext cx="3416161" cy="2273300"/>
+          </a:xfrm>
+          <a:prstGeom prst="rect">
+            <a:avLst/>
+          </a:prstGeom>
+        </p:spPr>
+      </p:pic>
     </p:spTree>
     <p:extLst>
       <p:ext uri="{BB962C8B-B14F-4D97-AF65-F5344CB8AC3E}">
@@ -6092,6 +6182,13 @@
             <a:r>
               <a:rPr lang="en-US" dirty="0" smtClean="0"/>
               <a:t> for security</a:t>
+            </a:r>
+          </a:p>
+          <a:p>
+            <a:pPr lvl="1"/>
+            <a:r>
+              <a:rPr lang="en-US" smtClean="0"/>
+              <a:t>Keep it cheap!</a:t>
             </a:r>
             <a:endParaRPr lang="en-US" dirty="0"/>
           </a:p>

</xml_diff>

<commit_message>
merge last 2 slides
</commit_message>
<xml_diff>
--- a/presentation.pptx
+++ b/presentation.pptx
@@ -13,7 +13,6 @@
     <p:sldId id="261" r:id="rId7"/>
     <p:sldId id="262" r:id="rId8"/>
     <p:sldId id="263" r:id="rId9"/>
-    <p:sldId id="264" r:id="rId10"/>
   </p:sldIdLst>
   <p:sldSz cx="12192000" cy="6858000"/>
   <p:notesSz cx="6858000" cy="9144000"/>
@@ -6187,7 +6186,7 @@
           <a:p>
             <a:pPr lvl="1"/>
             <a:r>
-              <a:rPr lang="en-US" smtClean="0"/>
+              <a:rPr lang="en-US" dirty="0" smtClean="0"/>
               <a:t>Keep it cheap!</a:t>
             </a:r>
             <a:endParaRPr lang="en-US" dirty="0"/>
@@ -7012,6 +7011,13 @@
               <a:rPr lang="en-US" dirty="0" smtClean="0"/>
               <a:t>Demo</a:t>
             </a:r>
+            <a:br>
+              <a:rPr lang="en-US" dirty="0" smtClean="0"/>
+            </a:br>
+            <a:r>
+              <a:rPr lang="en-US" dirty="0" smtClean="0"/>
+              <a:t>Deployment View</a:t>
+            </a:r>
             <a:endParaRPr lang="en-US" dirty="0"/>
           </a:p>
         </p:txBody>
@@ -7040,58 +7046,28 @@
         </p:blipFill>
         <p:spPr>
           <a:xfrm>
-            <a:off x="2993572" y="1963625"/>
-            <a:ext cx="5690506" cy="4267880"/>
+            <a:off x="7200900" y="2876833"/>
+            <a:ext cx="4215645" cy="3161734"/>
           </a:xfrm>
         </p:spPr>
       </p:pic>
-    </p:spTree>
-    <p:extLst>
-      <p:ext uri="{BB962C8B-B14F-4D97-AF65-F5344CB8AC3E}">
-        <p14:creationId xmlns:p14="http://schemas.microsoft.com/office/powerpoint/2010/main" val="680432816"/>
-      </p:ext>
-    </p:extLst>
-  </p:cSld>
-  <p:clrMapOvr>
-    <a:masterClrMapping/>
-  </p:clrMapOvr>
-</p:sld>
-</file>
-
-<file path=ppt/slides/slide9.xml><?xml version="1.0" encoding="utf-8"?>
-<p:sld xmlns:a="http://schemas.openxmlformats.org/drawingml/2006/main" xmlns:r="http://schemas.openxmlformats.org/officeDocument/2006/relationships" xmlns:p="http://schemas.openxmlformats.org/presentationml/2006/main">
-  <p:cSld>
-    <p:spTree>
-      <p:nvGrpSpPr>
-        <p:cNvPr id="1" name=""/>
-        <p:cNvGrpSpPr/>
-        <p:nvPr/>
-      </p:nvGrpSpPr>
-      <p:grpSpPr>
-        <a:xfrm>
-          <a:off x="0" y="0"/>
-          <a:ext cx="0" cy="0"/>
-          <a:chOff x="0" y="0"/>
-          <a:chExt cx="0" cy="0"/>
-        </a:xfrm>
-      </p:grpSpPr>
       <p:pic>
         <p:nvPicPr>
-          <p:cNvPr id="2" name="Picture 1"/>
+          <p:cNvPr id="11" name="Picture 10"/>
           <p:cNvPicPr>
             <a:picLocks noChangeAspect="1"/>
           </p:cNvPicPr>
           <p:nvPr/>
         </p:nvPicPr>
         <p:blipFill>
-          <a:blip r:embed="rId2"/>
+          <a:blip r:embed="rId3"/>
           <a:stretch>
             <a:fillRect/>
           </a:stretch>
         </p:blipFill>
         <p:spPr>
           <a:xfrm>
-            <a:off x="5562599" y="406924"/>
+            <a:off x="881742" y="613752"/>
             <a:ext cx="5360107" cy="6244248"/>
           </a:xfrm>
           <a:prstGeom prst="rect">
@@ -7099,280 +7075,10 @@
           </a:prstGeom>
         </p:spPr>
       </p:pic>
-      <p:sp>
-        <p:nvSpPr>
-          <p:cNvPr id="3" name="Content Placeholder 2"/>
-          <p:cNvSpPr txBox="1">
-            <a:spLocks/>
-          </p:cNvSpPr>
-          <p:nvPr/>
-        </p:nvSpPr>
-        <p:spPr>
-          <a:xfrm>
-            <a:off x="272143" y="1976846"/>
-            <a:ext cx="5573486" cy="4024125"/>
-          </a:xfrm>
-          <a:prstGeom prst="rect">
-            <a:avLst/>
-          </a:prstGeom>
-        </p:spPr>
-        <p:txBody>
-          <a:bodyPr/>
-          <a:lstStyle>
-            <a:lvl1pPr marL="228600" indent="-228600" algn="l" defTabSz="914400" rtl="0" eaLnBrk="1" latinLnBrk="0" hangingPunct="1">
-              <a:lnSpc>
-                <a:spcPct val="90000"/>
-              </a:lnSpc>
-              <a:spcBef>
-                <a:spcPts val="1000"/>
-              </a:spcBef>
-              <a:buFont typeface="Arial" panose="020B0604020202020204" pitchFamily="34" charset="0"/>
-              <a:buChar char="•"/>
-              <a:defRPr sz="2200" kern="1200">
-                <a:solidFill>
-                  <a:schemeClr val="tx1"/>
-                </a:solidFill>
-                <a:latin typeface="+mn-lt"/>
-                <a:ea typeface="+mn-ea"/>
-                <a:cs typeface="+mn-cs"/>
-              </a:defRPr>
-            </a:lvl1pPr>
-            <a:lvl2pPr marL="685800" indent="-228600" algn="l" defTabSz="914400" rtl="0" eaLnBrk="1" latinLnBrk="0" hangingPunct="1">
-              <a:lnSpc>
-                <a:spcPct val="90000"/>
-              </a:lnSpc>
-              <a:spcBef>
-                <a:spcPts val="500"/>
-              </a:spcBef>
-              <a:buFont typeface="Arial" panose="020B0604020202020204" pitchFamily="34" charset="0"/>
-              <a:buChar char="•"/>
-              <a:defRPr sz="2000" kern="1200">
-                <a:solidFill>
-                  <a:schemeClr val="tx1"/>
-                </a:solidFill>
-                <a:latin typeface="+mn-lt"/>
-                <a:ea typeface="+mn-ea"/>
-                <a:cs typeface="+mn-cs"/>
-              </a:defRPr>
-            </a:lvl2pPr>
-            <a:lvl3pPr marL="1143000" indent="-228600" algn="l" defTabSz="914400" rtl="0" eaLnBrk="1" latinLnBrk="0" hangingPunct="1">
-              <a:lnSpc>
-                <a:spcPct val="90000"/>
-              </a:lnSpc>
-              <a:spcBef>
-                <a:spcPts val="500"/>
-              </a:spcBef>
-              <a:buFont typeface="Arial" panose="020B0604020202020204" pitchFamily="34" charset="0"/>
-              <a:buChar char="•"/>
-              <a:defRPr sz="1800" kern="1200">
-                <a:solidFill>
-                  <a:schemeClr val="tx1"/>
-                </a:solidFill>
-                <a:latin typeface="+mn-lt"/>
-                <a:ea typeface="+mn-ea"/>
-                <a:cs typeface="+mn-cs"/>
-              </a:defRPr>
-            </a:lvl3pPr>
-            <a:lvl4pPr marL="1600200" indent="-228600" algn="l" defTabSz="914400" rtl="0" eaLnBrk="1" latinLnBrk="0" hangingPunct="1">
-              <a:lnSpc>
-                <a:spcPct val="90000"/>
-              </a:lnSpc>
-              <a:spcBef>
-                <a:spcPts val="500"/>
-              </a:spcBef>
-              <a:buFont typeface="Arial" panose="020B0604020202020204" pitchFamily="34" charset="0"/>
-              <a:buChar char="•"/>
-              <a:defRPr sz="1600" kern="1200">
-                <a:solidFill>
-                  <a:schemeClr val="tx1"/>
-                </a:solidFill>
-                <a:latin typeface="+mn-lt"/>
-                <a:ea typeface="+mn-ea"/>
-                <a:cs typeface="+mn-cs"/>
-              </a:defRPr>
-            </a:lvl4pPr>
-            <a:lvl5pPr marL="2057400" indent="-228600" algn="l" defTabSz="914400" rtl="0" eaLnBrk="1" latinLnBrk="0" hangingPunct="1">
-              <a:lnSpc>
-                <a:spcPct val="90000"/>
-              </a:lnSpc>
-              <a:spcBef>
-                <a:spcPts val="500"/>
-              </a:spcBef>
-              <a:buFont typeface="Arial" panose="020B0604020202020204" pitchFamily="34" charset="0"/>
-              <a:buChar char="•"/>
-              <a:defRPr sz="1600" kern="1200">
-                <a:solidFill>
-                  <a:schemeClr val="tx1"/>
-                </a:solidFill>
-                <a:latin typeface="+mn-lt"/>
-                <a:ea typeface="+mn-ea"/>
-                <a:cs typeface="+mn-cs"/>
-              </a:defRPr>
-            </a:lvl5pPr>
-            <a:lvl6pPr marL="2514600" indent="-228600" algn="l" defTabSz="914400" rtl="0" eaLnBrk="1" latinLnBrk="0" hangingPunct="1">
-              <a:lnSpc>
-                <a:spcPct val="90000"/>
-              </a:lnSpc>
-              <a:spcBef>
-                <a:spcPts val="500"/>
-              </a:spcBef>
-              <a:buFont typeface="Arial" panose="020B0604020202020204" pitchFamily="34" charset="0"/>
-              <a:buChar char="•"/>
-              <a:defRPr sz="1600" kern="1200">
-                <a:solidFill>
-                  <a:schemeClr val="tx1"/>
-                </a:solidFill>
-                <a:latin typeface="+mn-lt"/>
-                <a:ea typeface="+mn-ea"/>
-                <a:cs typeface="+mn-cs"/>
-              </a:defRPr>
-            </a:lvl6pPr>
-            <a:lvl7pPr marL="2971800" indent="-228600" algn="l" defTabSz="914400" rtl="0" eaLnBrk="1" latinLnBrk="0" hangingPunct="1">
-              <a:lnSpc>
-                <a:spcPct val="90000"/>
-              </a:lnSpc>
-              <a:spcBef>
-                <a:spcPts val="500"/>
-              </a:spcBef>
-              <a:buFont typeface="Arial" panose="020B0604020202020204" pitchFamily="34" charset="0"/>
-              <a:buChar char="•"/>
-              <a:defRPr sz="1600" kern="1200">
-                <a:solidFill>
-                  <a:schemeClr val="tx1"/>
-                </a:solidFill>
-                <a:latin typeface="+mn-lt"/>
-                <a:ea typeface="+mn-ea"/>
-                <a:cs typeface="+mn-cs"/>
-              </a:defRPr>
-            </a:lvl7pPr>
-            <a:lvl8pPr marL="3429000" indent="-228600" algn="l" defTabSz="914400" rtl="0" eaLnBrk="1" latinLnBrk="0" hangingPunct="1">
-              <a:lnSpc>
-                <a:spcPct val="90000"/>
-              </a:lnSpc>
-              <a:spcBef>
-                <a:spcPts val="500"/>
-              </a:spcBef>
-              <a:buFont typeface="Arial" panose="020B0604020202020204" pitchFamily="34" charset="0"/>
-              <a:buChar char="•"/>
-              <a:defRPr sz="1600" kern="1200">
-                <a:solidFill>
-                  <a:schemeClr val="tx1"/>
-                </a:solidFill>
-                <a:latin typeface="+mn-lt"/>
-                <a:ea typeface="+mn-ea"/>
-                <a:cs typeface="+mn-cs"/>
-              </a:defRPr>
-            </a:lvl8pPr>
-            <a:lvl9pPr marL="3886200" indent="-228600" algn="l" defTabSz="914400" rtl="0" eaLnBrk="1" latinLnBrk="0" hangingPunct="1">
-              <a:lnSpc>
-                <a:spcPct val="90000"/>
-              </a:lnSpc>
-              <a:spcBef>
-                <a:spcPts val="500"/>
-              </a:spcBef>
-              <a:buFont typeface="Arial" panose="020B0604020202020204" pitchFamily="34" charset="0"/>
-              <a:buChar char="•"/>
-              <a:defRPr sz="1600" kern="1200">
-                <a:solidFill>
-                  <a:schemeClr val="tx1"/>
-                </a:solidFill>
-                <a:latin typeface="+mn-lt"/>
-                <a:ea typeface="+mn-ea"/>
-                <a:cs typeface="+mn-cs"/>
-              </a:defRPr>
-            </a:lvl9pPr>
-          </a:lstStyle>
-          <a:p>
-            <a:pPr marL="0" indent="0">
-              <a:lnSpc>
-                <a:spcPct val="100000"/>
-              </a:lnSpc>
-              <a:spcBef>
-                <a:spcPts val="0"/>
-              </a:spcBef>
-              <a:buFont typeface="Arial" panose="020B0604020202020204" pitchFamily="34" charset="0"/>
-              <a:buNone/>
-            </a:pPr>
-            <a:r>
-              <a:rPr lang="en-US" dirty="0" smtClean="0"/>
-              <a:t>Deployment View</a:t>
-            </a:r>
-          </a:p>
-          <a:p>
-            <a:pPr marL="457200" indent="-457200">
-              <a:lnSpc>
-                <a:spcPct val="100000"/>
-              </a:lnSpc>
-              <a:spcBef>
-                <a:spcPts val="0"/>
-              </a:spcBef>
-              <a:buFont typeface="+mj-lt"/>
-              <a:buAutoNum type="arabicPeriod"/>
-            </a:pPr>
-            <a:endParaRPr lang="en-US" dirty="0" smtClean="0"/>
-          </a:p>
-          <a:p>
-            <a:pPr>
-              <a:lnSpc>
-                <a:spcPct val="100000"/>
-              </a:lnSpc>
-              <a:spcBef>
-                <a:spcPts val="0"/>
-              </a:spcBef>
-            </a:pPr>
-            <a:r>
-              <a:rPr lang="en-US" dirty="0" smtClean="0"/>
-              <a:t>Environment per Data Silo</a:t>
-            </a:r>
-          </a:p>
-          <a:p>
-            <a:pPr lvl="1">
-              <a:lnSpc>
-                <a:spcPct val="100000"/>
-              </a:lnSpc>
-              <a:spcBef>
-                <a:spcPts val="0"/>
-              </a:spcBef>
-            </a:pPr>
-            <a:r>
-              <a:rPr lang="en-US" dirty="0" smtClean="0"/>
-              <a:t>Protect the data</a:t>
-            </a:r>
-          </a:p>
-          <a:p>
-            <a:pPr>
-              <a:lnSpc>
-                <a:spcPct val="100000"/>
-              </a:lnSpc>
-              <a:spcBef>
-                <a:spcPts val="0"/>
-              </a:spcBef>
-            </a:pPr>
-            <a:r>
-              <a:rPr lang="en-US" dirty="0" smtClean="0"/>
-              <a:t>Buckets are unique to tenant</a:t>
-            </a:r>
-          </a:p>
-          <a:p>
-            <a:pPr>
-              <a:lnSpc>
-                <a:spcPct val="100000"/>
-              </a:lnSpc>
-              <a:spcBef>
-                <a:spcPts val="0"/>
-              </a:spcBef>
-            </a:pPr>
-            <a:r>
-              <a:rPr lang="en-US" dirty="0" smtClean="0"/>
-              <a:t>Kibana instance per tenant</a:t>
-            </a:r>
-          </a:p>
-        </p:txBody>
-      </p:sp>
     </p:spTree>
     <p:extLst>
       <p:ext uri="{BB962C8B-B14F-4D97-AF65-F5344CB8AC3E}">
-        <p14:creationId xmlns:p14="http://schemas.microsoft.com/office/powerpoint/2010/main" val="1814241987"/>
+        <p14:creationId xmlns:p14="http://schemas.microsoft.com/office/powerpoint/2010/main" val="680432816"/>
       </p:ext>
     </p:extLst>
   </p:cSld>

</xml_diff>